<commit_message>
Signed-off-by: Tobias Mohr <tobias.mohr@student.hpi.uni-potsdam.de> save presentation
</commit_message>
<xml_diff>
--- a/presentations/End-Projektvorstelltung (Tobias).pptx
+++ b/presentations/End-Projektvorstelltung (Tobias).pptx
@@ -6,14 +6,18 @@
     <p:sldMasterId id="2147483653" r:id="rId2"/>
   </p:sldMasterIdLst>
   <p:notesMasterIdLst>
-    <p:notesMasterId r:id="rId5"/>
+    <p:notesMasterId r:id="rId9"/>
   </p:notesMasterIdLst>
   <p:handoutMasterIdLst>
-    <p:handoutMasterId r:id="rId6"/>
+    <p:handoutMasterId r:id="rId10"/>
   </p:handoutMasterIdLst>
   <p:sldIdLst>
     <p:sldId id="256" r:id="rId3"/>
     <p:sldId id="280" r:id="rId4"/>
+    <p:sldId id="281" r:id="rId5"/>
+    <p:sldId id="282" r:id="rId6"/>
+    <p:sldId id="283" r:id="rId7"/>
+    <p:sldId id="284" r:id="rId8"/>
   </p:sldIdLst>
   <p:sldSz cx="9144000" cy="6858000" type="screen4x3"/>
   <p:notesSz cx="7772400" cy="10515600"/>
@@ -5697,29 +5701,353 @@
           </p:spPr>
         </p:pic>
       </p:grpSp>
+    </p:spTree>
+    <p:extLst>
+      <p:ext uri="{BB962C8B-B14F-4D97-AF65-F5344CB8AC3E}">
+        <p14:creationId xmlns:p14="http://schemas.microsoft.com/office/powerpoint/2010/main" val="2232386873"/>
+      </p:ext>
+    </p:extLst>
+  </p:cSld>
+  <p:clrMapOvr>
+    <a:masterClrMapping/>
+  </p:clrMapOvr>
+  <p:timing>
+    <p:tnLst>
+      <p:par>
+        <p:cTn xmlns:p14="http://schemas.microsoft.com/office/powerpoint/2010/main" id="1" dur="indefinite" restart="never" nodeType="tmRoot"/>
+      </p:par>
+    </p:tnLst>
+  </p:timing>
+</p:sld>
+</file>
+
+<file path=ppt/slides/slide3.xml><?xml version="1.0" encoding="utf-8"?>
+<p:sld xmlns:a="http://schemas.openxmlformats.org/drawingml/2006/main" xmlns:r="http://schemas.openxmlformats.org/officeDocument/2006/relationships" xmlns:p="http://schemas.openxmlformats.org/presentationml/2006/main">
+  <p:cSld>
+    <p:spTree>
+      <p:nvGrpSpPr>
+        <p:cNvPr id="1" name=""/>
+        <p:cNvGrpSpPr/>
+        <p:nvPr/>
+      </p:nvGrpSpPr>
+      <p:grpSpPr>
+        <a:xfrm>
+          <a:off x="0" y="0"/>
+          <a:ext cx="0" cy="0"/>
+          <a:chOff x="0" y="0"/>
+          <a:chExt cx="0" cy="0"/>
+        </a:xfrm>
+      </p:grpSpPr>
+      <p:sp>
+        <p:nvSpPr>
+          <p:cNvPr id="2" name="Title 1"/>
+          <p:cNvSpPr>
+            <a:spLocks noGrp="1"/>
+          </p:cNvSpPr>
+          <p:nvPr>
+            <p:ph type="title"/>
+          </p:nvPr>
+        </p:nvSpPr>
+        <p:spPr/>
+        <p:txBody>
+          <a:bodyPr/>
+          <a:lstStyle/>
+          <a:p>
+            <a:r>
+              <a:rPr lang="en-US" noProof="1" smtClean="0"/>
+              <a:t>Push Notifications Details</a:t>
+            </a:r>
+            <a:endParaRPr lang="en-US" noProof="1"/>
+          </a:p>
+        </p:txBody>
+      </p:sp>
+      <p:sp>
+        <p:nvSpPr>
+          <p:cNvPr id="4" name="Footer Placeholder 3"/>
+          <p:cNvSpPr>
+            <a:spLocks noGrp="1"/>
+          </p:cNvSpPr>
+          <p:nvPr>
+            <p:ph type="ftr" sz="quarter" idx="10"/>
+          </p:nvPr>
+        </p:nvSpPr>
+        <p:spPr/>
+        <p:txBody>
+          <a:bodyPr/>
+          <a:lstStyle/>
+          <a:p>
+            <a:r>
+              <a:rPr lang="de-DE" smtClean="0"/>
+              <a:t>Find All My Friends | Eingebettete Betriebssysteme | 7. Dezember 2011</a:t>
+            </a:r>
+            <a:endParaRPr lang="de-DE"/>
+          </a:p>
+        </p:txBody>
+      </p:sp>
+      <p:sp>
+        <p:nvSpPr>
+          <p:cNvPr id="5" name="Slide Number Placeholder 4"/>
+          <p:cNvSpPr>
+            <a:spLocks noGrp="1"/>
+          </p:cNvSpPr>
+          <p:nvPr>
+            <p:ph type="sldNum" sz="quarter" idx="11"/>
+          </p:nvPr>
+        </p:nvSpPr>
+        <p:spPr/>
+        <p:txBody>
+          <a:bodyPr/>
+          <a:lstStyle/>
+          <a:p>
+            <a:fld id="{0C6113F6-D982-4F1F-82B4-AFA466AB9AFB}" type="slidenum">
+              <a:rPr lang="de-DE" smtClean="0"/>
+              <a:pPr/>
+              <a:t>3</a:t>
+            </a:fld>
+            <a:endParaRPr lang="de-DE" dirty="0"/>
+          </a:p>
+        </p:txBody>
+      </p:sp>
+      <p:sp>
+        <p:nvSpPr>
+          <p:cNvPr id="11" name="Text Placeholder 10"/>
+          <p:cNvSpPr>
+            <a:spLocks noGrp="1"/>
+          </p:cNvSpPr>
+          <p:nvPr>
+            <p:ph type="body" sz="quarter" idx="13"/>
+          </p:nvPr>
+        </p:nvSpPr>
+        <p:spPr/>
+        <p:txBody>
+          <a:bodyPr/>
+          <a:lstStyle/>
+          <a:p>
+            <a:pPr marL="285750" indent="-285750">
+              <a:buFont typeface="Arial"/>
+              <a:buChar char="•"/>
+            </a:pPr>
+            <a:r>
+              <a:rPr lang="en-US" dirty="0" smtClean="0"/>
+              <a:t>persistent IP connection</a:t>
+            </a:r>
+          </a:p>
+          <a:p>
+            <a:pPr marL="285750" indent="-285750">
+              <a:buFont typeface="Arial"/>
+              <a:buChar char="•"/>
+            </a:pPr>
+            <a:r>
+              <a:rPr lang="en-US" dirty="0"/>
+              <a:t>s</a:t>
+            </a:r>
+            <a:r>
+              <a:rPr lang="en-US" dirty="0" smtClean="0"/>
+              <a:t>tore and forward </a:t>
+            </a:r>
+            <a:r>
+              <a:rPr lang="en-US" dirty="0" err="1" smtClean="0"/>
+              <a:t>principe</a:t>
+            </a:r>
+            <a:endParaRPr lang="en-US" dirty="0" smtClean="0"/>
+          </a:p>
+          <a:p>
+            <a:pPr marL="285750" indent="-285750">
+              <a:buFont typeface="Arial"/>
+              <a:buChar char="•"/>
+            </a:pPr>
+            <a:r>
+              <a:rPr lang="en-US" dirty="0" smtClean="0"/>
+              <a:t>one notification per device per user</a:t>
+            </a:r>
+            <a:endParaRPr lang="en-US" dirty="0"/>
+          </a:p>
+          <a:p>
+            <a:pPr marL="285750" indent="-285750">
+              <a:buFont typeface="Arial"/>
+              <a:buChar char="•"/>
+            </a:pPr>
+            <a:r>
+              <a:rPr lang="en-US" dirty="0" smtClean="0"/>
+              <a:t>secure authentication</a:t>
+            </a:r>
+          </a:p>
+          <a:p>
+            <a:pPr marL="285750" indent="-285750">
+              <a:buFont typeface="Arial"/>
+              <a:buChar char="•"/>
+            </a:pPr>
+            <a:r>
+              <a:rPr lang="en-US" dirty="0" smtClean="0"/>
+              <a:t>on port 5233</a:t>
+            </a:r>
+          </a:p>
+          <a:p>
+            <a:pPr marL="285750" indent="-285750">
+              <a:buFont typeface="Arial"/>
+              <a:buChar char="•"/>
+            </a:pPr>
+            <a:r>
+              <a:rPr lang="en-US" dirty="0" smtClean="0"/>
+              <a:t>message </a:t>
+            </a:r>
+            <a:r>
+              <a:rPr lang="en-US" dirty="0" err="1" smtClean="0"/>
+              <a:t>consits</a:t>
+            </a:r>
+            <a:r>
+              <a:rPr lang="en-US" dirty="0" smtClean="0"/>
+              <a:t> of:</a:t>
+            </a:r>
+          </a:p>
+          <a:p>
+            <a:pPr marL="731838" lvl="1" indent="-285750">
+              <a:buFont typeface="Arial"/>
+              <a:buChar char="•"/>
+            </a:pPr>
+            <a:r>
+              <a:rPr lang="en-US" dirty="0" smtClean="0"/>
+              <a:t>token</a:t>
+            </a:r>
+          </a:p>
+          <a:p>
+            <a:pPr marL="731838" lvl="1" indent="-285750">
+              <a:buFont typeface="Arial"/>
+              <a:buChar char="•"/>
+            </a:pPr>
+            <a:r>
+              <a:rPr lang="en-US" dirty="0" smtClean="0"/>
+              <a:t>payload (</a:t>
+            </a:r>
+            <a:r>
+              <a:rPr lang="en-US" dirty="0" err="1" smtClean="0"/>
+              <a:t>json</a:t>
+            </a:r>
+            <a:r>
+              <a:rPr lang="en-US" dirty="0" smtClean="0"/>
+              <a:t> </a:t>
+            </a:r>
+            <a:r>
+              <a:rPr lang="en-US" dirty="0"/>
+              <a:t>RFC 4627 )</a:t>
+            </a:r>
+          </a:p>
+          <a:p>
+            <a:pPr marL="285750" indent="-285750">
+              <a:buFont typeface="Arial"/>
+              <a:buChar char="•"/>
+            </a:pPr>
+            <a:endParaRPr lang="en-US" dirty="0" smtClean="0"/>
+          </a:p>
+          <a:p>
+            <a:endParaRPr lang="en-US" dirty="0" smtClean="0"/>
+          </a:p>
+          <a:p>
+            <a:pPr marL="285750" indent="-285750">
+              <a:buFont typeface="Arial"/>
+              <a:buChar char="•"/>
+            </a:pPr>
+            <a:endParaRPr lang="en-US" dirty="0" smtClean="0"/>
+          </a:p>
+          <a:p>
+            <a:pPr marL="285750" indent="-285750">
+              <a:buFont typeface="Arial"/>
+              <a:buChar char="•"/>
+            </a:pPr>
+            <a:endParaRPr lang="en-US" dirty="0" smtClean="0"/>
+          </a:p>
+          <a:p>
+            <a:pPr marL="285750" indent="-285750">
+              <a:buFont typeface="Arial"/>
+              <a:buChar char="•"/>
+            </a:pPr>
+            <a:endParaRPr lang="en-US" dirty="0" smtClean="0"/>
+          </a:p>
+          <a:p>
+            <a:pPr marL="285750" indent="-285750">
+              <a:buFont typeface="Arial"/>
+              <a:buChar char="•"/>
+            </a:pPr>
+            <a:endParaRPr lang="en-US" dirty="0"/>
+          </a:p>
+          <a:p>
+            <a:pPr marL="285750" indent="-285750">
+              <a:buFont typeface="Arial"/>
+              <a:buChar char="•"/>
+            </a:pPr>
+            <a:endParaRPr lang="en-US" dirty="0" smtClean="0"/>
+          </a:p>
+        </p:txBody>
+      </p:sp>
+      <p:sp>
+        <p:nvSpPr>
+          <p:cNvPr id="3" name="TextBox 2"/>
+          <p:cNvSpPr txBox="1"/>
+          <p:nvPr/>
+        </p:nvSpPr>
+        <p:spPr>
+          <a:xfrm>
+            <a:off x="593247" y="0"/>
+            <a:ext cx="587496" cy="369332"/>
+          </a:xfrm>
+          <a:prstGeom prst="rect">
+            <a:avLst/>
+          </a:prstGeom>
+          <a:noFill/>
+          <a:ln>
+            <a:noFill/>
+          </a:ln>
+        </p:spPr>
+        <p:txBody>
+          <a:bodyPr wrap="none" rtlCol="0">
+            <a:spAutoFit/>
+          </a:bodyPr>
+          <a:lstStyle/>
+          <a:p>
+            <a:r>
+              <a:rPr lang="de-DE" dirty="0" err="1" smtClean="0">
+                <a:solidFill>
+                  <a:schemeClr val="bg1">
+                    <a:lumMod val="50000"/>
+                  </a:schemeClr>
+                </a:solidFill>
+              </a:rPr>
+              <a:t>iOS</a:t>
+            </a:r>
+            <a:endParaRPr lang="de-DE" dirty="0" smtClean="0">
+              <a:solidFill>
+                <a:schemeClr val="bg1">
+                  <a:lumMod val="50000"/>
+                </a:schemeClr>
+              </a:solidFill>
+            </a:endParaRPr>
+          </a:p>
+        </p:txBody>
+      </p:sp>
       <p:pic>
         <p:nvPicPr>
-          <p:cNvPr id="14" name="Picture 13" descr="20090819-8pi896q8n3bthiha2gaaacgebc.jpg"/>
+          <p:cNvPr id="12" name="Picture 11" descr="registration_sequence.jpg"/>
           <p:cNvPicPr>
             <a:picLocks noChangeAspect="1"/>
           </p:cNvPicPr>
           <p:nvPr/>
         </p:nvPicPr>
-        <p:blipFill rotWithShape="1">
-          <a:blip r:embed="rId5">
+        <p:blipFill>
+          <a:blip r:embed="rId2">
             <a:extLst>
               <a:ext uri="{28A0092B-C50C-407E-A947-70E740481C1C}">
                 <a14:useLocalDpi xmlns:a14="http://schemas.microsoft.com/office/drawing/2010/main" val="0"/>
               </a:ext>
             </a:extLst>
           </a:blip>
-          <a:srcRect t="37754" b="33672"/>
-          <a:stretch/>
+          <a:stretch>
+            <a:fillRect/>
+          </a:stretch>
         </p:blipFill>
         <p:spPr>
           <a:xfrm>
-            <a:off x="9633536" y="3560926"/>
-            <a:ext cx="2148613" cy="926699"/>
+            <a:off x="759542" y="1760178"/>
+            <a:ext cx="4013635" cy="2623370"/>
           </a:xfrm>
           <a:prstGeom prst="rect">
             <a:avLst/>
@@ -5728,142 +6056,839 @@
       </p:pic>
       <p:sp>
         <p:nvSpPr>
-          <p:cNvPr id="25" name="Text Placeholder 16"/>
-          <p:cNvSpPr>
-            <a:spLocks noGrp="1"/>
-          </p:cNvSpPr>
-          <p:nvPr>
-            <p:ph type="body" sz="quarter" idx="13"/>
-          </p:nvPr>
+          <p:cNvPr id="15" name="TextBox 14"/>
+          <p:cNvSpPr txBox="1"/>
+          <p:nvPr/>
         </p:nvSpPr>
         <p:spPr>
           <a:xfrm>
-            <a:off x="1275678" y="4178932"/>
-            <a:ext cx="3349720" cy="1824345"/>
+            <a:off x="783166" y="4399935"/>
+            <a:ext cx="2502082" cy="276999"/>
+          </a:xfrm>
+          <a:prstGeom prst="rect">
+            <a:avLst/>
+          </a:prstGeom>
+          <a:noFill/>
+        </p:spPr>
+        <p:txBody>
+          <a:bodyPr wrap="none" rtlCol="0">
+            <a:spAutoFit/>
+          </a:bodyPr>
+          <a:lstStyle/>
+          <a:p>
+            <a:r>
+              <a:rPr lang="de-DE" sz="1200" dirty="0" smtClean="0">
+                <a:solidFill>
+                  <a:srgbClr val="7F7F7F"/>
+                </a:solidFill>
+              </a:rPr>
+              <a:t>Source: Apple </a:t>
+            </a:r>
+            <a:r>
+              <a:rPr lang="en-US" sz="1200" dirty="0">
+                <a:solidFill>
+                  <a:srgbClr val="7F7F7F"/>
+                </a:solidFill>
+              </a:rPr>
+              <a:t>D</a:t>
+            </a:r>
+            <a:r>
+              <a:rPr lang="en-US" sz="1200" dirty="0" smtClean="0">
+                <a:solidFill>
+                  <a:srgbClr val="7F7F7F"/>
+                </a:solidFill>
+              </a:rPr>
+              <a:t>ocumentation</a:t>
+            </a:r>
+            <a:endParaRPr lang="de-DE" sz="1200" dirty="0" smtClean="0">
+              <a:solidFill>
+                <a:srgbClr val="7F7F7F"/>
+              </a:solidFill>
+            </a:endParaRPr>
+          </a:p>
+        </p:txBody>
+      </p:sp>
+    </p:spTree>
+    <p:extLst>
+      <p:ext uri="{BB962C8B-B14F-4D97-AF65-F5344CB8AC3E}">
+        <p14:creationId xmlns:p14="http://schemas.microsoft.com/office/powerpoint/2010/main" val="3291906089"/>
+      </p:ext>
+    </p:extLst>
+  </p:cSld>
+  <p:clrMapOvr>
+    <a:masterClrMapping/>
+  </p:clrMapOvr>
+  <p:timing>
+    <p:tnLst>
+      <p:par>
+        <p:cTn xmlns:p14="http://schemas.microsoft.com/office/powerpoint/2010/main" id="1" dur="indefinite" restart="never" nodeType="tmRoot"/>
+      </p:par>
+    </p:tnLst>
+  </p:timing>
+</p:sld>
+</file>
+
+<file path=ppt/slides/slide4.xml><?xml version="1.0" encoding="utf-8"?>
+<p:sld xmlns:a="http://schemas.openxmlformats.org/drawingml/2006/main" xmlns:r="http://schemas.openxmlformats.org/officeDocument/2006/relationships" xmlns:p="http://schemas.openxmlformats.org/presentationml/2006/main">
+  <p:cSld>
+    <p:spTree>
+      <p:nvGrpSpPr>
+        <p:cNvPr id="1" name=""/>
+        <p:cNvGrpSpPr/>
+        <p:nvPr/>
+      </p:nvGrpSpPr>
+      <p:grpSpPr>
+        <a:xfrm>
+          <a:off x="0" y="0"/>
+          <a:ext cx="0" cy="0"/>
+          <a:chOff x="0" y="0"/>
+          <a:chExt cx="0" cy="0"/>
+        </a:xfrm>
+      </p:grpSpPr>
+      <p:sp>
+        <p:nvSpPr>
+          <p:cNvPr id="2" name="Title 1"/>
+          <p:cNvSpPr>
+            <a:spLocks noGrp="1"/>
+          </p:cNvSpPr>
+          <p:nvPr>
+            <p:ph type="title"/>
+          </p:nvPr>
+        </p:nvSpPr>
+        <p:spPr/>
+        <p:txBody>
+          <a:bodyPr/>
+          <a:lstStyle/>
+          <a:p>
+            <a:r>
+              <a:rPr lang="en-US" noProof="1" smtClean="0"/>
+              <a:t>Push Notifications: Send Message</a:t>
+            </a:r>
+            <a:endParaRPr lang="en-US" noProof="1"/>
+          </a:p>
+        </p:txBody>
+      </p:sp>
+      <p:sp>
+        <p:nvSpPr>
+          <p:cNvPr id="4" name="Footer Placeholder 3"/>
+          <p:cNvSpPr>
+            <a:spLocks noGrp="1"/>
+          </p:cNvSpPr>
+          <p:nvPr>
+            <p:ph type="ftr" sz="quarter" idx="10"/>
+          </p:nvPr>
+        </p:nvSpPr>
+        <p:spPr/>
+        <p:txBody>
+          <a:bodyPr/>
+          <a:lstStyle/>
+          <a:p>
+            <a:r>
+              <a:rPr lang="de-DE" smtClean="0"/>
+              <a:t>Find All My Friends | Eingebettete Betriebssysteme | 7. Dezember 2011</a:t>
+            </a:r>
+            <a:endParaRPr lang="de-DE"/>
+          </a:p>
+        </p:txBody>
+      </p:sp>
+      <p:sp>
+        <p:nvSpPr>
+          <p:cNvPr id="5" name="Slide Number Placeholder 4"/>
+          <p:cNvSpPr>
+            <a:spLocks noGrp="1"/>
+          </p:cNvSpPr>
+          <p:nvPr>
+            <p:ph type="sldNum" sz="quarter" idx="11"/>
+          </p:nvPr>
+        </p:nvSpPr>
+        <p:spPr/>
+        <p:txBody>
+          <a:bodyPr/>
+          <a:lstStyle/>
+          <a:p>
+            <a:fld id="{0C6113F6-D982-4F1F-82B4-AFA466AB9AFB}" type="slidenum">
+              <a:rPr lang="de-DE" smtClean="0"/>
+              <a:pPr/>
+              <a:t>4</a:t>
+            </a:fld>
+            <a:endParaRPr lang="de-DE" dirty="0"/>
+          </a:p>
+        </p:txBody>
+      </p:sp>
+      <p:sp>
+        <p:nvSpPr>
+          <p:cNvPr id="3" name="TextBox 2"/>
+          <p:cNvSpPr txBox="1"/>
+          <p:nvPr/>
+        </p:nvSpPr>
+        <p:spPr>
+          <a:xfrm>
+            <a:off x="593247" y="0"/>
+            <a:ext cx="587496" cy="369332"/>
+          </a:xfrm>
+          <a:prstGeom prst="rect">
+            <a:avLst/>
+          </a:prstGeom>
+          <a:noFill/>
+          <a:ln>
+            <a:noFill/>
+          </a:ln>
+        </p:spPr>
+        <p:txBody>
+          <a:bodyPr wrap="none" rtlCol="0">
+            <a:spAutoFit/>
+          </a:bodyPr>
+          <a:lstStyle/>
+          <a:p>
+            <a:r>
+              <a:rPr lang="de-DE" dirty="0" err="1" smtClean="0">
+                <a:solidFill>
+                  <a:schemeClr val="bg1">
+                    <a:lumMod val="50000"/>
+                  </a:schemeClr>
+                </a:solidFill>
+              </a:rPr>
+              <a:t>iOS</a:t>
+            </a:r>
+            <a:endParaRPr lang="de-DE" dirty="0" smtClean="0">
+              <a:solidFill>
+                <a:schemeClr val="bg1">
+                  <a:lumMod val="50000"/>
+                </a:schemeClr>
+              </a:solidFill>
+            </a:endParaRPr>
+          </a:p>
+        </p:txBody>
+      </p:sp>
+      <p:sp>
+        <p:nvSpPr>
+          <p:cNvPr id="15" name="TextBox 14"/>
+          <p:cNvSpPr txBox="1"/>
+          <p:nvPr/>
+        </p:nvSpPr>
+        <p:spPr>
+          <a:xfrm>
+            <a:off x="5265037" y="6227097"/>
+            <a:ext cx="2502082" cy="276999"/>
+          </a:xfrm>
+          <a:prstGeom prst="rect">
+            <a:avLst/>
+          </a:prstGeom>
+          <a:noFill/>
+        </p:spPr>
+        <p:txBody>
+          <a:bodyPr wrap="none" rtlCol="0">
+            <a:spAutoFit/>
+          </a:bodyPr>
+          <a:lstStyle/>
+          <a:p>
+            <a:r>
+              <a:rPr lang="de-DE" sz="1200" dirty="0" smtClean="0">
+                <a:solidFill>
+                  <a:srgbClr val="7F7F7F"/>
+                </a:solidFill>
+              </a:rPr>
+              <a:t>Source: Apple </a:t>
+            </a:r>
+            <a:r>
+              <a:rPr lang="en-US" sz="1200" dirty="0">
+                <a:solidFill>
+                  <a:srgbClr val="7F7F7F"/>
+                </a:solidFill>
+              </a:rPr>
+              <a:t>D</a:t>
+            </a:r>
+            <a:r>
+              <a:rPr lang="en-US" sz="1200" dirty="0" smtClean="0">
+                <a:solidFill>
+                  <a:srgbClr val="7F7F7F"/>
+                </a:solidFill>
+              </a:rPr>
+              <a:t>ocumentation</a:t>
+            </a:r>
+            <a:endParaRPr lang="de-DE" sz="1200" dirty="0" smtClean="0">
+              <a:solidFill>
+                <a:srgbClr val="7F7F7F"/>
+              </a:solidFill>
+            </a:endParaRPr>
+          </a:p>
+        </p:txBody>
+      </p:sp>
+      <p:pic>
+        <p:nvPicPr>
+          <p:cNvPr id="6" name="Picture 5" descr="token_trust.jpg"/>
+          <p:cNvPicPr>
+            <a:picLocks noChangeAspect="1"/>
+          </p:cNvPicPr>
+          <p:nvPr/>
+        </p:nvPicPr>
+        <p:blipFill>
+          <a:blip r:embed="rId2">
+            <a:extLst>
+              <a:ext uri="{28A0092B-C50C-407E-A947-70E740481C1C}">
+                <a14:useLocalDpi xmlns:a14="http://schemas.microsoft.com/office/drawing/2010/main" val="0"/>
+              </a:ext>
+            </a:extLst>
+          </a:blip>
+          <a:stretch>
+            <a:fillRect/>
+          </a:stretch>
+        </p:blipFill>
+        <p:spPr>
+          <a:xfrm>
+            <a:off x="731680" y="1506999"/>
+            <a:ext cx="6451600" cy="4737100"/>
+          </a:xfrm>
+          <a:prstGeom prst="rect">
+            <a:avLst/>
+          </a:prstGeom>
+        </p:spPr>
+      </p:pic>
+    </p:spTree>
+    <p:extLst>
+      <p:ext uri="{BB962C8B-B14F-4D97-AF65-F5344CB8AC3E}">
+        <p14:creationId xmlns:p14="http://schemas.microsoft.com/office/powerpoint/2010/main" val="2384216656"/>
+      </p:ext>
+    </p:extLst>
+  </p:cSld>
+  <p:clrMapOvr>
+    <a:masterClrMapping/>
+  </p:clrMapOvr>
+  <p:timing>
+    <p:tnLst>
+      <p:par>
+        <p:cTn xmlns:p14="http://schemas.microsoft.com/office/powerpoint/2010/main" id="1" dur="indefinite" restart="never" nodeType="tmRoot"/>
+      </p:par>
+    </p:tnLst>
+  </p:timing>
+</p:sld>
+</file>
+
+<file path=ppt/slides/slide5.xml><?xml version="1.0" encoding="utf-8"?>
+<p:sld xmlns:a="http://schemas.openxmlformats.org/drawingml/2006/main" xmlns:r="http://schemas.openxmlformats.org/officeDocument/2006/relationships" xmlns:p="http://schemas.openxmlformats.org/presentationml/2006/main">
+  <p:cSld>
+    <p:spTree>
+      <p:nvGrpSpPr>
+        <p:cNvPr id="1" name=""/>
+        <p:cNvGrpSpPr/>
+        <p:nvPr/>
+      </p:nvGrpSpPr>
+      <p:grpSpPr>
+        <a:xfrm>
+          <a:off x="0" y="0"/>
+          <a:ext cx="0" cy="0"/>
+          <a:chOff x="0" y="0"/>
+          <a:chExt cx="0" cy="0"/>
+        </a:xfrm>
+      </p:grpSpPr>
+      <p:sp>
+        <p:nvSpPr>
+          <p:cNvPr id="2" name="Title 1"/>
+          <p:cNvSpPr>
+            <a:spLocks noGrp="1"/>
+          </p:cNvSpPr>
+          <p:nvPr>
+            <p:ph type="title"/>
+          </p:nvPr>
+        </p:nvSpPr>
+        <p:spPr/>
+        <p:txBody>
+          <a:bodyPr/>
+          <a:lstStyle/>
+          <a:p>
+            <a:r>
+              <a:rPr lang="en-US" noProof="1" smtClean="0"/>
+              <a:t>Push Notifications: Receive Message</a:t>
+            </a:r>
+            <a:endParaRPr lang="en-US" noProof="1"/>
+          </a:p>
+        </p:txBody>
+      </p:sp>
+      <p:sp>
+        <p:nvSpPr>
+          <p:cNvPr id="4" name="Footer Placeholder 3"/>
+          <p:cNvSpPr>
+            <a:spLocks noGrp="1"/>
+          </p:cNvSpPr>
+          <p:nvPr>
+            <p:ph type="ftr" sz="quarter" idx="10"/>
+          </p:nvPr>
+        </p:nvSpPr>
+        <p:spPr/>
+        <p:txBody>
+          <a:bodyPr/>
+          <a:lstStyle/>
+          <a:p>
+            <a:r>
+              <a:rPr lang="de-DE" smtClean="0"/>
+              <a:t>Find All My Friends | Eingebettete Betriebssysteme | 7. Dezember 2011</a:t>
+            </a:r>
+            <a:endParaRPr lang="de-DE"/>
+          </a:p>
+        </p:txBody>
+      </p:sp>
+      <p:sp>
+        <p:nvSpPr>
+          <p:cNvPr id="5" name="Slide Number Placeholder 4"/>
+          <p:cNvSpPr>
+            <a:spLocks noGrp="1"/>
+          </p:cNvSpPr>
+          <p:nvPr>
+            <p:ph type="sldNum" sz="quarter" idx="11"/>
+          </p:nvPr>
+        </p:nvSpPr>
+        <p:spPr/>
+        <p:txBody>
+          <a:bodyPr/>
+          <a:lstStyle/>
+          <a:p>
+            <a:fld id="{0C6113F6-D982-4F1F-82B4-AFA466AB9AFB}" type="slidenum">
+              <a:rPr lang="de-DE" smtClean="0"/>
+              <a:pPr/>
+              <a:t>5</a:t>
+            </a:fld>
+            <a:endParaRPr lang="de-DE" dirty="0"/>
+          </a:p>
+        </p:txBody>
+      </p:sp>
+      <p:sp>
+        <p:nvSpPr>
+          <p:cNvPr id="3" name="TextBox 2"/>
+          <p:cNvSpPr txBox="1"/>
+          <p:nvPr/>
+        </p:nvSpPr>
+        <p:spPr>
+          <a:xfrm>
+            <a:off x="593247" y="0"/>
+            <a:ext cx="587496" cy="369332"/>
+          </a:xfrm>
+          <a:prstGeom prst="rect">
+            <a:avLst/>
+          </a:prstGeom>
+          <a:noFill/>
+          <a:ln>
+            <a:noFill/>
+          </a:ln>
+        </p:spPr>
+        <p:txBody>
+          <a:bodyPr wrap="none" rtlCol="0">
+            <a:spAutoFit/>
+          </a:bodyPr>
+          <a:lstStyle/>
+          <a:p>
+            <a:r>
+              <a:rPr lang="de-DE" dirty="0" err="1" smtClean="0">
+                <a:solidFill>
+                  <a:schemeClr val="bg1">
+                    <a:lumMod val="50000"/>
+                  </a:schemeClr>
+                </a:solidFill>
+              </a:rPr>
+              <a:t>iOS</a:t>
+            </a:r>
+            <a:endParaRPr lang="de-DE" dirty="0" smtClean="0">
+              <a:solidFill>
+                <a:schemeClr val="bg1">
+                  <a:lumMod val="50000"/>
+                </a:schemeClr>
+              </a:solidFill>
+            </a:endParaRPr>
+          </a:p>
+        </p:txBody>
+      </p:sp>
+      <p:sp>
+        <p:nvSpPr>
+          <p:cNvPr id="15" name="TextBox 14"/>
+          <p:cNvSpPr txBox="1"/>
+          <p:nvPr/>
+        </p:nvSpPr>
+        <p:spPr>
+          <a:xfrm>
+            <a:off x="5265037" y="6227097"/>
+            <a:ext cx="2502082" cy="276999"/>
+          </a:xfrm>
+          <a:prstGeom prst="rect">
+            <a:avLst/>
+          </a:prstGeom>
+          <a:noFill/>
+        </p:spPr>
+        <p:txBody>
+          <a:bodyPr wrap="none" rtlCol="0">
+            <a:spAutoFit/>
+          </a:bodyPr>
+          <a:lstStyle/>
+          <a:p>
+            <a:r>
+              <a:rPr lang="de-DE" sz="1200" dirty="0" smtClean="0">
+                <a:solidFill>
+                  <a:srgbClr val="7F7F7F"/>
+                </a:solidFill>
+              </a:rPr>
+              <a:t>Source: Apple </a:t>
+            </a:r>
+            <a:r>
+              <a:rPr lang="en-US" sz="1200" dirty="0">
+                <a:solidFill>
+                  <a:srgbClr val="7F7F7F"/>
+                </a:solidFill>
+              </a:rPr>
+              <a:t>D</a:t>
+            </a:r>
+            <a:r>
+              <a:rPr lang="en-US" sz="1200" dirty="0" smtClean="0">
+                <a:solidFill>
+                  <a:srgbClr val="7F7F7F"/>
+                </a:solidFill>
+              </a:rPr>
+              <a:t>ocumentation</a:t>
+            </a:r>
+            <a:endParaRPr lang="de-DE" sz="1200" dirty="0" smtClean="0">
+              <a:solidFill>
+                <a:srgbClr val="7F7F7F"/>
+              </a:solidFill>
+            </a:endParaRPr>
+          </a:p>
+        </p:txBody>
+      </p:sp>
+      <p:pic>
+        <p:nvPicPr>
+          <p:cNvPr id="7" name="Picture 6" descr="token_generation.jpg"/>
+          <p:cNvPicPr>
+            <a:picLocks noChangeAspect="1"/>
+          </p:cNvPicPr>
+          <p:nvPr/>
+        </p:nvPicPr>
+        <p:blipFill>
+          <a:blip r:embed="rId2">
+            <a:extLst>
+              <a:ext uri="{28A0092B-C50C-407E-A947-70E740481C1C}">
+                <a14:useLocalDpi xmlns:a14="http://schemas.microsoft.com/office/drawing/2010/main" val="0"/>
+              </a:ext>
+            </a:extLst>
+          </a:blip>
+          <a:stretch>
+            <a:fillRect/>
+          </a:stretch>
+        </p:blipFill>
+        <p:spPr>
+          <a:xfrm>
+            <a:off x="723080" y="1548581"/>
+            <a:ext cx="7937500" cy="4572000"/>
+          </a:xfrm>
+          <a:prstGeom prst="rect">
+            <a:avLst/>
+          </a:prstGeom>
+        </p:spPr>
+      </p:pic>
+    </p:spTree>
+    <p:extLst>
+      <p:ext uri="{BB962C8B-B14F-4D97-AF65-F5344CB8AC3E}">
+        <p14:creationId xmlns:p14="http://schemas.microsoft.com/office/powerpoint/2010/main" val="2968454007"/>
+      </p:ext>
+    </p:extLst>
+  </p:cSld>
+  <p:clrMapOvr>
+    <a:masterClrMapping/>
+  </p:clrMapOvr>
+  <p:timing>
+    <p:tnLst>
+      <p:par>
+        <p:cTn xmlns:p14="http://schemas.microsoft.com/office/powerpoint/2010/main" id="1" dur="indefinite" restart="never" nodeType="tmRoot"/>
+      </p:par>
+    </p:tnLst>
+  </p:timing>
+</p:sld>
+</file>
+
+<file path=ppt/slides/slide6.xml><?xml version="1.0" encoding="utf-8"?>
+<p:sld xmlns:a="http://schemas.openxmlformats.org/drawingml/2006/main" xmlns:r="http://schemas.openxmlformats.org/officeDocument/2006/relationships" xmlns:p="http://schemas.openxmlformats.org/presentationml/2006/main">
+  <p:cSld>
+    <p:spTree>
+      <p:nvGrpSpPr>
+        <p:cNvPr id="1" name=""/>
+        <p:cNvGrpSpPr/>
+        <p:nvPr/>
+      </p:nvGrpSpPr>
+      <p:grpSpPr>
+        <a:xfrm>
+          <a:off x="0" y="0"/>
+          <a:ext cx="0" cy="0"/>
+          <a:chOff x="0" y="0"/>
+          <a:chExt cx="0" cy="0"/>
+        </a:xfrm>
+      </p:grpSpPr>
+      <p:sp>
+        <p:nvSpPr>
+          <p:cNvPr id="2" name="Title 1"/>
+          <p:cNvSpPr>
+            <a:spLocks noGrp="1"/>
+          </p:cNvSpPr>
+          <p:nvPr>
+            <p:ph type="title"/>
+          </p:nvPr>
+        </p:nvSpPr>
+        <p:spPr/>
+        <p:txBody>
+          <a:bodyPr/>
+          <a:lstStyle/>
+          <a:p>
+            <a:r>
+              <a:rPr lang="en-US" noProof="1" smtClean="0"/>
+              <a:t>Push Notifications: Message Format</a:t>
+            </a:r>
+            <a:endParaRPr lang="en-US" noProof="1"/>
+          </a:p>
+        </p:txBody>
+      </p:sp>
+      <p:sp>
+        <p:nvSpPr>
+          <p:cNvPr id="8" name="Content Placeholder 7"/>
+          <p:cNvSpPr>
+            <a:spLocks noGrp="1"/>
+          </p:cNvSpPr>
+          <p:nvPr>
+            <p:ph idx="1"/>
+          </p:nvPr>
+        </p:nvSpPr>
+        <p:spPr>
+          <a:xfrm>
+            <a:off x="719138" y="3310194"/>
+            <a:ext cx="8174037" cy="3214431"/>
           </a:xfrm>
         </p:spPr>
         <p:txBody>
           <a:bodyPr/>
           <a:lstStyle/>
           <a:p>
-            <a:pPr algn="ctr"/>
             <a:r>
               <a:rPr lang="en-US" dirty="0" smtClean="0"/>
-              <a:t>Local Notification</a:t>
-            </a:r>
-          </a:p>
-          <a:p>
-            <a:pPr marL="285750" indent="-285750">
+              <a:t>Message Structure:</a:t>
+            </a:r>
+          </a:p>
+          <a:p>
+            <a:pPr marL="731838" lvl="1" indent="-285750">
               <a:buFont typeface="Arial"/>
               <a:buChar char="•"/>
             </a:pPr>
             <a:r>
               <a:rPr lang="en-US" dirty="0" smtClean="0"/>
-              <a:t>time event</a:t>
-            </a:r>
-          </a:p>
-        </p:txBody>
-      </p:sp>
-      <p:sp>
-        <p:nvSpPr>
-          <p:cNvPr id="26" name="Text Placeholder 16"/>
-          <p:cNvSpPr>
-            <a:spLocks noGrp="1"/>
-          </p:cNvSpPr>
-          <p:nvPr>
-            <p:ph type="body" sz="quarter" idx="13"/>
-          </p:nvPr>
-        </p:nvSpPr>
-        <p:spPr>
-          <a:xfrm>
-            <a:off x="4742083" y="4174752"/>
-            <a:ext cx="3313818" cy="1824345"/>
-          </a:xfrm>
-        </p:spPr>
-        <p:txBody>
-          <a:bodyPr/>
-          <a:lstStyle/>
-          <a:p>
-            <a:pPr algn="ctr"/>
-            <a:r>
-              <a:rPr lang="en-US" dirty="0" smtClean="0"/>
-              <a:t>Remote Notification</a:t>
-            </a:r>
-          </a:p>
-          <a:p>
-            <a:pPr marL="285750" indent="-285750">
+              <a:t>length of full message 256 Byte</a:t>
+            </a:r>
+          </a:p>
+          <a:p>
+            <a:pPr marL="731838" lvl="1" indent="-285750">
               <a:buFont typeface="Arial"/>
               <a:buChar char="•"/>
             </a:pPr>
             <a:r>
               <a:rPr lang="en-US" dirty="0" smtClean="0"/>
-              <a:t>remote</a:t>
-            </a:r>
-          </a:p>
-        </p:txBody>
-      </p:sp>
-      <p:cxnSp>
-        <p:nvCxnSpPr>
-          <p:cNvPr id="30" name="Straight Connector 29"/>
-          <p:cNvCxnSpPr/>
+              <a:t>message header and token 	</a:t>
+            </a:r>
+            <a:r>
+              <a:rPr lang="en-US" dirty="0" smtClean="0">
+                <a:sym typeface="Wingdings"/>
+              </a:rPr>
+              <a:t></a:t>
+            </a:r>
+            <a:r>
+              <a:rPr lang="en-US" dirty="0" smtClean="0"/>
+              <a:t> Binary</a:t>
+            </a:r>
+          </a:p>
+          <a:p>
+            <a:pPr marL="731838" lvl="1" indent="-285750">
+              <a:buFont typeface="Arial"/>
+              <a:buChar char="•"/>
+            </a:pPr>
+            <a:r>
+              <a:rPr lang="en-US" dirty="0" smtClean="0"/>
+              <a:t>message payload </a:t>
+            </a:r>
+            <a:r>
+              <a:rPr lang="en-US" dirty="0"/>
+              <a:t>	</a:t>
+            </a:r>
+            <a:r>
+              <a:rPr lang="en-US" dirty="0" smtClean="0"/>
+              <a:t>	</a:t>
+            </a:r>
+            <a:r>
+              <a:rPr lang="en-US" dirty="0" smtClean="0">
+                <a:sym typeface="Wingdings"/>
+              </a:rPr>
+              <a:t> JSON</a:t>
+            </a:r>
+          </a:p>
+          <a:p>
+            <a:endParaRPr lang="en-US" dirty="0">
+              <a:sym typeface="Wingdings"/>
+            </a:endParaRPr>
+          </a:p>
+          <a:p>
+            <a:r>
+              <a:rPr lang="en-US" dirty="0" smtClean="0">
+                <a:sym typeface="Wingdings"/>
+              </a:rPr>
+              <a:t>Feedback Service:</a:t>
+            </a:r>
+          </a:p>
+          <a:p>
+            <a:pPr marL="731838" lvl="1" indent="-285750">
+              <a:buFont typeface="Arial"/>
+              <a:buChar char="•"/>
+            </a:pPr>
+            <a:r>
+              <a:rPr lang="en-US" dirty="0" smtClean="0">
+                <a:sym typeface="Wingdings"/>
+              </a:rPr>
+              <a:t>message send, when the application is deleted from phone</a:t>
+            </a:r>
+          </a:p>
+          <a:p>
+            <a:pPr marL="731838" lvl="1" indent="-285750">
+              <a:buFont typeface="Arial"/>
+              <a:buChar char="•"/>
+            </a:pPr>
+            <a:r>
+              <a:rPr lang="en-US" dirty="0" smtClean="0">
+                <a:sym typeface="Wingdings"/>
+              </a:rPr>
+              <a:t>binary message</a:t>
+            </a:r>
+          </a:p>
+          <a:p>
+            <a:endParaRPr lang="en-US" dirty="0" smtClean="0">
+              <a:sym typeface="Wingdings"/>
+            </a:endParaRPr>
+          </a:p>
+        </p:txBody>
+      </p:sp>
+      <p:sp>
+        <p:nvSpPr>
+          <p:cNvPr id="4" name="Footer Placeholder 3"/>
+          <p:cNvSpPr>
+            <a:spLocks noGrp="1"/>
+          </p:cNvSpPr>
+          <p:nvPr>
+            <p:ph type="ftr" sz="quarter" idx="10"/>
+          </p:nvPr>
+        </p:nvSpPr>
+        <p:spPr/>
+        <p:txBody>
+          <a:bodyPr/>
+          <a:lstStyle/>
+          <a:p>
+            <a:r>
+              <a:rPr lang="de-DE" smtClean="0"/>
+              <a:t>Find All My Friends | Eingebettete Betriebssysteme | 7. Dezember 2011</a:t>
+            </a:r>
+            <a:endParaRPr lang="de-DE"/>
+          </a:p>
+        </p:txBody>
+      </p:sp>
+      <p:sp>
+        <p:nvSpPr>
+          <p:cNvPr id="5" name="Slide Number Placeholder 4"/>
+          <p:cNvSpPr>
+            <a:spLocks noGrp="1"/>
+          </p:cNvSpPr>
+          <p:nvPr>
+            <p:ph type="sldNum" sz="quarter" idx="11"/>
+          </p:nvPr>
+        </p:nvSpPr>
+        <p:spPr/>
+        <p:txBody>
+          <a:bodyPr/>
+          <a:lstStyle/>
+          <a:p>
+            <a:fld id="{0C6113F6-D982-4F1F-82B4-AFA466AB9AFB}" type="slidenum">
+              <a:rPr lang="de-DE" smtClean="0"/>
+              <a:pPr/>
+              <a:t>6</a:t>
+            </a:fld>
+            <a:endParaRPr lang="de-DE" dirty="0"/>
+          </a:p>
+        </p:txBody>
+      </p:sp>
+      <p:sp>
+        <p:nvSpPr>
+          <p:cNvPr id="3" name="TextBox 2"/>
+          <p:cNvSpPr txBox="1"/>
           <p:nvPr/>
-        </p:nvCxnSpPr>
-        <p:spPr bwMode="auto">
+        </p:nvSpPr>
+        <p:spPr>
           <a:xfrm>
-            <a:off x="1471023" y="4556221"/>
-            <a:ext cx="6740323" cy="0"/>
+            <a:off x="593247" y="0"/>
+            <a:ext cx="587496" cy="369332"/>
           </a:xfrm>
-          <a:prstGeom prst="line">
+          <a:prstGeom prst="rect">
             <a:avLst/>
           </a:prstGeom>
-          <a:solidFill>
-            <a:schemeClr val="accent1"/>
-          </a:solidFill>
-          <a:ln w="19050" cap="flat" cmpd="sng" algn="ctr">
-            <a:solidFill>
-              <a:schemeClr val="tx1"/>
-            </a:solidFill>
-            <a:prstDash val="solid"/>
-            <a:round/>
-            <a:headEnd type="none" w="med" len="med"/>
-            <a:tailEnd type="none" w="med" len="med"/>
+          <a:noFill/>
+          <a:ln>
+            <a:noFill/>
           </a:ln>
-          <a:effectLst/>
         </p:spPr>
-      </p:cxnSp>
-      <p:cxnSp>
-        <p:nvCxnSpPr>
-          <p:cNvPr id="37" name="Straight Connector 36"/>
-          <p:cNvCxnSpPr/>
+        <p:txBody>
+          <a:bodyPr wrap="none" rtlCol="0">
+            <a:spAutoFit/>
+          </a:bodyPr>
+          <a:lstStyle/>
+          <a:p>
+            <a:r>
+              <a:rPr lang="de-DE" dirty="0" err="1" smtClean="0">
+                <a:solidFill>
+                  <a:schemeClr val="bg1">
+                    <a:lumMod val="50000"/>
+                  </a:schemeClr>
+                </a:solidFill>
+              </a:rPr>
+              <a:t>iOS</a:t>
+            </a:r>
+            <a:endParaRPr lang="de-DE" dirty="0" smtClean="0">
+              <a:solidFill>
+                <a:schemeClr val="bg1">
+                  <a:lumMod val="50000"/>
+                </a:schemeClr>
+              </a:solidFill>
+            </a:endParaRPr>
+          </a:p>
+        </p:txBody>
+      </p:sp>
+      <p:pic>
+        <p:nvPicPr>
+          <p:cNvPr id="6" name="Picture 5" descr="aps_binary_provider_2.jpg"/>
+          <p:cNvPicPr>
+            <a:picLocks noChangeAspect="1"/>
+          </p:cNvPicPr>
           <p:nvPr/>
-        </p:nvCxnSpPr>
-        <p:spPr bwMode="auto">
+        </p:nvPicPr>
+        <p:blipFill>
+          <a:blip r:embed="rId2">
+            <a:extLst>
+              <a:ext uri="{28A0092B-C50C-407E-A947-70E740481C1C}">
+                <a14:useLocalDpi xmlns:a14="http://schemas.microsoft.com/office/drawing/2010/main" val="0"/>
+              </a:ext>
+            </a:extLst>
+          </a:blip>
+          <a:stretch>
+            <a:fillRect/>
+          </a:stretch>
+        </p:blipFill>
+        <p:spPr>
           <a:xfrm>
-            <a:off x="4686710" y="4178721"/>
-            <a:ext cx="0" cy="2212256"/>
+            <a:off x="630903" y="1734574"/>
+            <a:ext cx="8305800" cy="1168400"/>
           </a:xfrm>
-          <a:prstGeom prst="line">
+          <a:prstGeom prst="rect">
             <a:avLst/>
           </a:prstGeom>
-          <a:solidFill>
-            <a:schemeClr val="accent1"/>
-          </a:solidFill>
-          <a:ln w="9525" cap="flat" cmpd="sng" algn="ctr">
-            <a:solidFill>
-              <a:schemeClr val="tx1"/>
-            </a:solidFill>
-            <a:prstDash val="lgDash"/>
-            <a:round/>
-            <a:headEnd type="none" w="med" len="med"/>
-            <a:tailEnd type="none" w="med" len="med"/>
-          </a:ln>
-          <a:effectLst/>
         </p:spPr>
-      </p:cxnSp>
+      </p:pic>
     </p:spTree>
     <p:extLst>
       <p:ext uri="{BB962C8B-B14F-4D97-AF65-F5344CB8AC3E}">
-        <p14:creationId xmlns:p14="http://schemas.microsoft.com/office/powerpoint/2010/main" val="2232386873"/>
+        <p14:creationId xmlns:p14="http://schemas.microsoft.com/office/powerpoint/2010/main" val="187899895"/>
       </p:ext>
     </p:extLst>
   </p:cSld>

</xml_diff>